<commit_message>
added Bitly to ppt
</commit_message>
<xml_diff>
--- a/webscraping/WWCDC_Beautiful Soup.pptx
+++ b/webscraping/WWCDC_Beautiful Soup.pptx
@@ -13,7 +13,7 @@
     <p:sldId id="258" r:id="rId4"/>
     <p:sldId id="259" r:id="rId5"/>
     <p:sldId id="260" r:id="rId6"/>
-    <p:sldId id="261" r:id="rId7"/>
+    <p:sldId id="262" r:id="rId7"/>
   </p:sldIdLst>
   <p:sldSz cx="9144000" cy="5143500" type="screen16x9"/>
   <p:notesSz cx="6858000" cy="9144000"/>
@@ -964,7 +964,7 @@
         </p:nvSpPr>
         <p:spPr>
           <a:xfrm>
-            <a:off x="381300" y="685800"/>
+            <a:off x="381000" y="685800"/>
             <a:ext cx="6096000" cy="3429000"/>
           </a:xfrm>
           <a:custGeom>
@@ -1252,7 +1252,7 @@
   <p:cSld>
     <p:spTree>
       <p:nvGrpSpPr>
-        <p:cNvPr id="1" name="Shape 83"/>
+        <p:cNvPr id="1" name="Shape 72"/>
         <p:cNvGrpSpPr/>
         <p:nvPr/>
       </p:nvGrpSpPr>
@@ -1266,7 +1266,7 @@
       </p:grpSpPr>
       <p:sp>
         <p:nvSpPr>
-          <p:cNvPr id="84" name="Shape 84"/>
+          <p:cNvPr id="73" name="Shape 73"/>
           <p:cNvSpPr>
             <a:spLocks noGrp="1" noRot="1" noChangeAspect="1"/>
           </p:cNvSpPr>
@@ -1276,7 +1276,7 @@
         </p:nvSpPr>
         <p:spPr>
           <a:xfrm>
-            <a:off x="381300" y="685800"/>
+            <a:off x="381000" y="685800"/>
             <a:ext cx="6096000" cy="3429000"/>
           </a:xfrm>
           <a:custGeom>
@@ -1307,7 +1307,7 @@
       </p:sp>
       <p:sp>
         <p:nvSpPr>
-          <p:cNvPr id="85" name="Shape 85"/>
+          <p:cNvPr id="74" name="Shape 74"/>
           <p:cNvSpPr txBox="1">
             <a:spLocks noGrp="1"/>
           </p:cNvSpPr>
@@ -1339,15 +1339,16 @@
               </a:spcAft>
               <a:buNone/>
             </a:pPr>
-            <a:r>
-              <a:rPr lang="en"/>
-              <a:t>https://www.crummy.com/software/BeautifulSoup/bs4/doc/#making-the-soup</a:t>
-            </a:r>
             <a:endParaRPr/>
           </a:p>
         </p:txBody>
       </p:sp>
     </p:spTree>
+    <p:extLst>
+      <p:ext uri="{BB962C8B-B14F-4D97-AF65-F5344CB8AC3E}">
+        <p14:creationId xmlns:p14="http://schemas.microsoft.com/office/powerpoint/2010/main" val="2397333796"/>
+      </p:ext>
+    </p:extLst>
   </p:cSld>
   <p:clrMapOvr>
     <a:masterClrMapping/>
@@ -7426,10 +7427,18 @@
               <a:buNone/>
             </a:pPr>
             <a:r>
-              <a:rPr lang="en" sz="3600"/>
-              <a:t>Pytho 3: pip3 install beautifulsoup4</a:t>
+              <a:rPr lang="en" sz="3600" dirty="0" err="1"/>
+              <a:t>Pytho</a:t>
             </a:r>
-            <a:endParaRPr sz="3600"/>
+            <a:r>
+              <a:rPr lang="en-US" sz="3600" dirty="0"/>
+              <a:t>n</a:t>
+            </a:r>
+            <a:r>
+              <a:rPr lang="en" sz="3600" dirty="0"/>
+              <a:t> 3: pip3 install beautifulsoup4</a:t>
+            </a:r>
+            <a:endParaRPr sz="3600" dirty="0"/>
           </a:p>
           <a:p>
             <a:pPr marL="0" lvl="0" indent="0">
@@ -7442,10 +7451,10 @@
               <a:buNone/>
             </a:pPr>
             <a:r>
-              <a:rPr lang="en" sz="3600"/>
+              <a:rPr lang="en" sz="3600" dirty="0"/>
               <a:t>Python 2.7: pip install beautifulsoup4</a:t>
             </a:r>
-            <a:endParaRPr sz="3600"/>
+            <a:endParaRPr sz="3600" dirty="0"/>
           </a:p>
           <a:p>
             <a:pPr marL="0" lvl="0" indent="0" algn="l" rtl="0">
@@ -7460,7 +7469,7 @@
               </a:spcAft>
               <a:buNone/>
             </a:pPr>
-            <a:endParaRPr sz="3600"/>
+            <a:endParaRPr sz="3600" dirty="0"/>
           </a:p>
           <a:p>
             <a:pPr marL="0" lvl="0" indent="0" algn="l" rtl="0">
@@ -7476,10 +7485,14 @@
               <a:buNone/>
             </a:pPr>
             <a:r>
-              <a:rPr lang="en" sz="3600"/>
-              <a:t>conda install -c anaconda beautifulsoup4</a:t>
+              <a:rPr lang="en" sz="3600" dirty="0" err="1"/>
+              <a:t>conda</a:t>
             </a:r>
-            <a:endParaRPr sz="3600"/>
+            <a:r>
+              <a:rPr lang="en" sz="3600" dirty="0"/>
+              <a:t> install -c anaconda beautifulsoup4</a:t>
+            </a:r>
+            <a:endParaRPr sz="3600" dirty="0"/>
           </a:p>
         </p:txBody>
       </p:sp>
@@ -7773,7 +7786,7 @@
   <p:cSld>
     <p:spTree>
       <p:nvGrpSpPr>
-        <p:cNvPr id="1" name="Shape 86"/>
+        <p:cNvPr id="1" name="Shape 75"/>
         <p:cNvGrpSpPr/>
         <p:nvPr/>
       </p:nvGrpSpPr>
@@ -7787,7 +7800,7 @@
       </p:grpSpPr>
       <p:sp>
         <p:nvSpPr>
-          <p:cNvPr id="87" name="Shape 87"/>
+          <p:cNvPr id="76" name="Shape 76"/>
           <p:cNvSpPr txBox="1">
             <a:spLocks noGrp="1"/>
           </p:cNvSpPr>
@@ -7797,71 +7810,42 @@
         </p:nvSpPr>
         <p:spPr>
           <a:xfrm>
-            <a:off x="311700" y="391350"/>
-            <a:ext cx="8520600" cy="626100"/>
+            <a:off x="509550" y="1423875"/>
+            <a:ext cx="8124900" cy="1798200"/>
           </a:xfrm>
           <a:prstGeom prst="rect">
             <a:avLst/>
           </a:prstGeom>
         </p:spPr>
         <p:txBody>
-          <a:bodyPr spcFirstLastPara="1" wrap="square" lIns="91425" tIns="91425" rIns="91425" bIns="91425" anchor="t" anchorCtr="0">
+          <a:bodyPr spcFirstLastPara="1" wrap="square" lIns="91425" tIns="91425" rIns="91425" bIns="91425" anchor="ctr" anchorCtr="0">
             <a:noAutofit/>
           </a:bodyPr>
           <a:lstStyle/>
           <a:p>
-            <a:pPr marL="0" lvl="0" indent="0">
-              <a:spcBef>
-                <a:spcPts val="0"/>
-              </a:spcBef>
-              <a:spcAft>
-                <a:spcPts val="0"/>
-              </a:spcAft>
-              <a:buNone/>
-            </a:pPr>
-            <a:endParaRPr/>
-          </a:p>
-        </p:txBody>
-      </p:sp>
-      <p:sp>
-        <p:nvSpPr>
-          <p:cNvPr id="88" name="Shape 88"/>
-          <p:cNvSpPr txBox="1">
-            <a:spLocks noGrp="1"/>
-          </p:cNvSpPr>
-          <p:nvPr>
-            <p:ph type="body" idx="1"/>
-          </p:nvPr>
-        </p:nvSpPr>
-        <p:spPr>
-          <a:xfrm>
-            <a:off x="311700" y="1152475"/>
-            <a:ext cx="8520600" cy="3416400"/>
-          </a:xfrm>
-          <a:prstGeom prst="rect">
-            <a:avLst/>
-          </a:prstGeom>
-        </p:spPr>
-        <p:txBody>
-          <a:bodyPr spcFirstLastPara="1" wrap="square" lIns="91425" tIns="91425" rIns="91425" bIns="91425" anchor="t" anchorCtr="0">
-            <a:noAutofit/>
-          </a:bodyPr>
-          <a:lstStyle/>
-          <a:p>
-            <a:pPr marL="0" lvl="0" indent="0">
-              <a:spcBef>
-                <a:spcPts val="0"/>
-              </a:spcBef>
-              <a:spcAft>
-                <a:spcPts val="1600"/>
-              </a:spcAft>
-              <a:buNone/>
-            </a:pPr>
-            <a:endParaRPr/>
+            <a:pPr lvl="0"/>
+            <a:r>
+              <a:rPr lang="en-US" dirty="0"/>
+              <a:t>https://</a:t>
+            </a:r>
+            <a:r>
+              <a:rPr lang="en-US" dirty="0" err="1"/>
+              <a:t>bit.ly</a:t>
+            </a:r>
+            <a:r>
+              <a:rPr lang="en-US" dirty="0"/>
+              <a:t>/2JCPPAi</a:t>
+            </a:r>
+            <a:endParaRPr dirty="0"/>
           </a:p>
         </p:txBody>
       </p:sp>
     </p:spTree>
+    <p:extLst>
+      <p:ext uri="{BB962C8B-B14F-4D97-AF65-F5344CB8AC3E}">
+        <p14:creationId xmlns:p14="http://schemas.microsoft.com/office/powerpoint/2010/main" val="267100906"/>
+      </p:ext>
+    </p:extLst>
   </p:cSld>
   <p:clrMapOvr>
     <a:masterClrMapping/>

</xml_diff>